<commit_message>
check in bt driver code
</commit_message>
<xml_diff>
--- a/bluetooth_basic_v0.1/Doc/软件架构.pptx
+++ b/bluetooth_basic_v0.1/Doc/软件架构.pptx
@@ -195,7 +195,7 @@
           <a:p>
             <a:fld id="{65F4D595-035B-4DEC-84DA-8AF3E05E2789}" type="datetimeFigureOut">
               <a:rPr lang="zh-CN" altLang="en-US" smtClean="0"/>
-              <a:t>2021/5/20</a:t>
+              <a:t>2021/5/29</a:t>
             </a:fld>
             <a:endParaRPr lang="zh-CN" altLang="en-US"/>
           </a:p>
@@ -644,7 +644,7 @@
           <a:p>
             <a:fld id="{530820CF-B880-4189-942D-D702A7CBA730}" type="datetimeFigureOut">
               <a:rPr lang="zh-CN" altLang="en-US" smtClean="0"/>
-              <a:t>2021/5/20</a:t>
+              <a:t>2021/5/29</a:t>
             </a:fld>
             <a:endParaRPr lang="zh-CN" altLang="en-US"/>
           </a:p>
@@ -816,7 +816,7 @@
           <a:p>
             <a:fld id="{530820CF-B880-4189-942D-D702A7CBA730}" type="datetimeFigureOut">
               <a:rPr lang="zh-CN" altLang="en-US" smtClean="0"/>
-              <a:t>2021/5/20</a:t>
+              <a:t>2021/5/29</a:t>
             </a:fld>
             <a:endParaRPr lang="zh-CN" altLang="en-US"/>
           </a:p>
@@ -998,7 +998,7 @@
           <a:p>
             <a:fld id="{530820CF-B880-4189-942D-D702A7CBA730}" type="datetimeFigureOut">
               <a:rPr lang="zh-CN" altLang="en-US" smtClean="0"/>
-              <a:t>2021/5/20</a:t>
+              <a:t>2021/5/29</a:t>
             </a:fld>
             <a:endParaRPr lang="zh-CN" altLang="en-US"/>
           </a:p>
@@ -1170,7 +1170,7 @@
           <a:p>
             <a:fld id="{530820CF-B880-4189-942D-D702A7CBA730}" type="datetimeFigureOut">
               <a:rPr lang="zh-CN" altLang="en-US" smtClean="0"/>
-              <a:t>2021/5/20</a:t>
+              <a:t>2021/5/29</a:t>
             </a:fld>
             <a:endParaRPr lang="zh-CN" altLang="en-US"/>
           </a:p>
@@ -1411,7 +1411,7 @@
           <a:p>
             <a:fld id="{530820CF-B880-4189-942D-D702A7CBA730}" type="datetimeFigureOut">
               <a:rPr lang="zh-CN" altLang="en-US" smtClean="0"/>
-              <a:t>2021/5/20</a:t>
+              <a:t>2021/5/29</a:t>
             </a:fld>
             <a:endParaRPr lang="zh-CN" altLang="en-US"/>
           </a:p>
@@ -1694,7 +1694,7 @@
           <a:p>
             <a:fld id="{530820CF-B880-4189-942D-D702A7CBA730}" type="datetimeFigureOut">
               <a:rPr lang="zh-CN" altLang="en-US" smtClean="0"/>
-              <a:t>2021/5/20</a:t>
+              <a:t>2021/5/29</a:t>
             </a:fld>
             <a:endParaRPr lang="zh-CN" altLang="en-US"/>
           </a:p>
@@ -2111,7 +2111,7 @@
           <a:p>
             <a:fld id="{530820CF-B880-4189-942D-D702A7CBA730}" type="datetimeFigureOut">
               <a:rPr lang="zh-CN" altLang="en-US" smtClean="0"/>
-              <a:t>2021/5/20</a:t>
+              <a:t>2021/5/29</a:t>
             </a:fld>
             <a:endParaRPr lang="zh-CN" altLang="en-US"/>
           </a:p>
@@ -2224,7 +2224,7 @@
           <a:p>
             <a:fld id="{530820CF-B880-4189-942D-D702A7CBA730}" type="datetimeFigureOut">
               <a:rPr lang="zh-CN" altLang="en-US" smtClean="0"/>
-              <a:t>2021/5/20</a:t>
+              <a:t>2021/5/29</a:t>
             </a:fld>
             <a:endParaRPr lang="zh-CN" altLang="en-US"/>
           </a:p>
@@ -2314,7 +2314,7 @@
           <a:p>
             <a:fld id="{530820CF-B880-4189-942D-D702A7CBA730}" type="datetimeFigureOut">
               <a:rPr lang="zh-CN" altLang="en-US" smtClean="0"/>
-              <a:t>2021/5/20</a:t>
+              <a:t>2021/5/29</a:t>
             </a:fld>
             <a:endParaRPr lang="zh-CN" altLang="en-US"/>
           </a:p>
@@ -2593,7 +2593,7 @@
           <a:p>
             <a:fld id="{530820CF-B880-4189-942D-D702A7CBA730}" type="datetimeFigureOut">
               <a:rPr lang="zh-CN" altLang="en-US" smtClean="0"/>
-              <a:t>2021/5/20</a:t>
+              <a:t>2021/5/29</a:t>
             </a:fld>
             <a:endParaRPr lang="zh-CN" altLang="en-US"/>
           </a:p>
@@ -2841,7 +2841,7 @@
           <a:p>
             <a:fld id="{530820CF-B880-4189-942D-D702A7CBA730}" type="datetimeFigureOut">
               <a:rPr lang="zh-CN" altLang="en-US" smtClean="0"/>
-              <a:t>2021/5/20</a:t>
+              <a:t>2021/5/29</a:t>
             </a:fld>
             <a:endParaRPr lang="zh-CN" altLang="en-US"/>
           </a:p>
@@ -3049,7 +3049,7 @@
           <a:p>
             <a:fld id="{530820CF-B880-4189-942D-D702A7CBA730}" type="datetimeFigureOut">
               <a:rPr lang="zh-CN" altLang="en-US" smtClean="0"/>
-              <a:t>2021/5/20</a:t>
+              <a:t>2021/5/29</a:t>
             </a:fld>
             <a:endParaRPr lang="zh-CN" altLang="en-US"/>
           </a:p>
@@ -10954,7 +10954,7 @@
         <a:sysClr val="windowText" lastClr="000000"/>
       </a:dk1>
       <a:lt1>
-        <a:sysClr val="window" lastClr="CAEACE"/>
+        <a:sysClr val="window" lastClr="FFFFFF"/>
       </a:lt1>
       <a:dk2>
         <a:srgbClr val="1F497D"/>
@@ -11237,7 +11237,7 @@
         <a:sysClr val="windowText" lastClr="000000"/>
       </a:dk1>
       <a:lt1>
-        <a:sysClr val="window" lastClr="CAEACE"/>
+        <a:sysClr val="window" lastClr="FFFFFF"/>
       </a:lt1>
       <a:dk2>
         <a:srgbClr val="1F497D"/>

</xml_diff>